<commit_message>
Working on pcb layout for warm components
</commit_message>
<xml_diff>
--- a/quantumswitchv2.pptx
+++ b/quantumswitchv2.pptx
@@ -10,6 +10,9 @@
     <p:sldId id="258" r:id="rId4"/>
     <p:sldId id="259" r:id="rId5"/>
     <p:sldId id="260" r:id="rId6"/>
+    <p:sldId id="262" r:id="rId7"/>
+    <p:sldId id="261" r:id="rId8"/>
+    <p:sldId id="263" r:id="rId9"/>
   </p:sldIdLst>
   <p:sldSz cx="12192000" cy="6858000"/>
   <p:notesSz cx="6858000" cy="9144000"/>
@@ -263,7 +266,7 @@
           <a:p>
             <a:fld id="{9C290927-91CE-40EB-8327-37D7FF970875}" type="datetimeFigureOut">
               <a:rPr lang="en-US" smtClean="0"/>
-              <a:t>11/6/2024</a:t>
+              <a:t>11/8/2024</a:t>
             </a:fld>
             <a:endParaRPr lang="en-US"/>
           </a:p>
@@ -461,7 +464,7 @@
           <a:p>
             <a:fld id="{9C290927-91CE-40EB-8327-37D7FF970875}" type="datetimeFigureOut">
               <a:rPr lang="en-US" smtClean="0"/>
-              <a:t>11/6/2024</a:t>
+              <a:t>11/8/2024</a:t>
             </a:fld>
             <a:endParaRPr lang="en-US"/>
           </a:p>
@@ -669,7 +672,7 @@
           <a:p>
             <a:fld id="{9C290927-91CE-40EB-8327-37D7FF970875}" type="datetimeFigureOut">
               <a:rPr lang="en-US" smtClean="0"/>
-              <a:t>11/6/2024</a:t>
+              <a:t>11/8/2024</a:t>
             </a:fld>
             <a:endParaRPr lang="en-US"/>
           </a:p>
@@ -867,7 +870,7 @@
           <a:p>
             <a:fld id="{9C290927-91CE-40EB-8327-37D7FF970875}" type="datetimeFigureOut">
               <a:rPr lang="en-US" smtClean="0"/>
-              <a:t>11/6/2024</a:t>
+              <a:t>11/8/2024</a:t>
             </a:fld>
             <a:endParaRPr lang="en-US"/>
           </a:p>
@@ -1142,7 +1145,7 @@
           <a:p>
             <a:fld id="{9C290927-91CE-40EB-8327-37D7FF970875}" type="datetimeFigureOut">
               <a:rPr lang="en-US" smtClean="0"/>
-              <a:t>11/6/2024</a:t>
+              <a:t>11/8/2024</a:t>
             </a:fld>
             <a:endParaRPr lang="en-US"/>
           </a:p>
@@ -1407,7 +1410,7 @@
           <a:p>
             <a:fld id="{9C290927-91CE-40EB-8327-37D7FF970875}" type="datetimeFigureOut">
               <a:rPr lang="en-US" smtClean="0"/>
-              <a:t>11/6/2024</a:t>
+              <a:t>11/8/2024</a:t>
             </a:fld>
             <a:endParaRPr lang="en-US"/>
           </a:p>
@@ -1819,7 +1822,7 @@
           <a:p>
             <a:fld id="{9C290927-91CE-40EB-8327-37D7FF970875}" type="datetimeFigureOut">
               <a:rPr lang="en-US" smtClean="0"/>
-              <a:t>11/6/2024</a:t>
+              <a:t>11/8/2024</a:t>
             </a:fld>
             <a:endParaRPr lang="en-US"/>
           </a:p>
@@ -1960,7 +1963,7 @@
           <a:p>
             <a:fld id="{9C290927-91CE-40EB-8327-37D7FF970875}" type="datetimeFigureOut">
               <a:rPr lang="en-US" smtClean="0"/>
-              <a:t>11/6/2024</a:t>
+              <a:t>11/8/2024</a:t>
             </a:fld>
             <a:endParaRPr lang="en-US"/>
           </a:p>
@@ -2073,7 +2076,7 @@
           <a:p>
             <a:fld id="{9C290927-91CE-40EB-8327-37D7FF970875}" type="datetimeFigureOut">
               <a:rPr lang="en-US" smtClean="0"/>
-              <a:t>11/6/2024</a:t>
+              <a:t>11/8/2024</a:t>
             </a:fld>
             <a:endParaRPr lang="en-US"/>
           </a:p>
@@ -2384,7 +2387,7 @@
           <a:p>
             <a:fld id="{9C290927-91CE-40EB-8327-37D7FF970875}" type="datetimeFigureOut">
               <a:rPr lang="en-US" smtClean="0"/>
-              <a:t>11/6/2024</a:t>
+              <a:t>11/8/2024</a:t>
             </a:fld>
             <a:endParaRPr lang="en-US"/>
           </a:p>
@@ -2672,7 +2675,7 @@
           <a:p>
             <a:fld id="{9C290927-91CE-40EB-8327-37D7FF970875}" type="datetimeFigureOut">
               <a:rPr lang="en-US" smtClean="0"/>
-              <a:t>11/6/2024</a:t>
+              <a:t>11/8/2024</a:t>
             </a:fld>
             <a:endParaRPr lang="en-US"/>
           </a:p>
@@ -2913,7 +2916,7 @@
           <a:p>
             <a:fld id="{9C290927-91CE-40EB-8327-37D7FF970875}" type="datetimeFigureOut">
               <a:rPr lang="en-US" smtClean="0"/>
-              <a:t>11/6/2024</a:t>
+              <a:t>11/8/2024</a:t>
             </a:fld>
             <a:endParaRPr lang="en-US"/>
           </a:p>
@@ -7131,6 +7134,294 @@
 </p:sld>
 </file>
 
+<file path=ppt/slides/slide6.xml><?xml version="1.0" encoding="utf-8"?>
+<p:sld xmlns:a="http://schemas.openxmlformats.org/drawingml/2006/main" xmlns:r="http://schemas.openxmlformats.org/officeDocument/2006/relationships" xmlns:p="http://schemas.openxmlformats.org/presentationml/2006/main">
+  <p:cSld>
+    <p:spTree>
+      <p:nvGrpSpPr>
+        <p:cNvPr id="1" name=""/>
+        <p:cNvGrpSpPr/>
+        <p:nvPr/>
+      </p:nvGrpSpPr>
+      <p:grpSpPr>
+        <a:xfrm>
+          <a:off x="0" y="0"/>
+          <a:ext cx="0" cy="0"/>
+          <a:chOff x="0" y="0"/>
+          <a:chExt cx="0" cy="0"/>
+        </a:xfrm>
+      </p:grpSpPr>
+      <p:sp>
+        <p:nvSpPr>
+          <p:cNvPr id="2" name="Title 1">
+            <a:extLst>
+              <a:ext uri="{FF2B5EF4-FFF2-40B4-BE49-F238E27FC236}">
+                <a16:creationId xmlns:a16="http://schemas.microsoft.com/office/drawing/2014/main" id="{4A78F957-93B2-108A-0DF5-6290A19B29A1}"/>
+              </a:ext>
+            </a:extLst>
+          </p:cNvPr>
+          <p:cNvSpPr>
+            <a:spLocks noGrp="1"/>
+          </p:cNvSpPr>
+          <p:nvPr>
+            <p:ph type="title"/>
+          </p:nvPr>
+        </p:nvSpPr>
+        <p:spPr/>
+        <p:txBody>
+          <a:bodyPr/>
+          <a:lstStyle/>
+          <a:p>
+            <a:r>
+              <a:rPr lang="en-US" dirty="0"/>
+              <a:t>DB25-relay-HV-control</a:t>
+            </a:r>
+          </a:p>
+        </p:txBody>
+      </p:sp>
+      <p:pic>
+        <p:nvPicPr>
+          <p:cNvPr id="5" name="Picture 4">
+            <a:extLst>
+              <a:ext uri="{FF2B5EF4-FFF2-40B4-BE49-F238E27FC236}">
+                <a16:creationId xmlns:a16="http://schemas.microsoft.com/office/drawing/2014/main" id="{2DE0C58B-63CA-EE88-AD10-8C60AC57464F}"/>
+              </a:ext>
+            </a:extLst>
+          </p:cNvPr>
+          <p:cNvPicPr>
+            <a:picLocks noChangeAspect="1"/>
+          </p:cNvPicPr>
+          <p:nvPr/>
+        </p:nvPicPr>
+        <p:blipFill>
+          <a:blip r:embed="rId2"/>
+          <a:stretch>
+            <a:fillRect/>
+          </a:stretch>
+        </p:blipFill>
+        <p:spPr>
+          <a:xfrm>
+            <a:off x="741035" y="2183363"/>
+            <a:ext cx="4415427" cy="4014612"/>
+          </a:xfrm>
+          <a:prstGeom prst="rect">
+            <a:avLst/>
+          </a:prstGeom>
+        </p:spPr>
+      </p:pic>
+      <p:pic>
+        <p:nvPicPr>
+          <p:cNvPr id="7" name="Picture 6">
+            <a:extLst>
+              <a:ext uri="{FF2B5EF4-FFF2-40B4-BE49-F238E27FC236}">
+                <a16:creationId xmlns:a16="http://schemas.microsoft.com/office/drawing/2014/main" id="{FAA2BC2E-824C-E581-6291-98B2B6997750}"/>
+              </a:ext>
+            </a:extLst>
+          </p:cNvPr>
+          <p:cNvPicPr>
+            <a:picLocks noChangeAspect="1"/>
+          </p:cNvPicPr>
+          <p:nvPr/>
+        </p:nvPicPr>
+        <p:blipFill>
+          <a:blip r:embed="rId3"/>
+          <a:stretch>
+            <a:fillRect/>
+          </a:stretch>
+        </p:blipFill>
+        <p:spPr>
+          <a:xfrm>
+            <a:off x="6683849" y="2083103"/>
+            <a:ext cx="4512592" cy="4114872"/>
+          </a:xfrm>
+          <a:prstGeom prst="rect">
+            <a:avLst/>
+          </a:prstGeom>
+        </p:spPr>
+      </p:pic>
+    </p:spTree>
+    <p:extLst>
+      <p:ext uri="{BB962C8B-B14F-4D97-AF65-F5344CB8AC3E}">
+        <p14:creationId xmlns:p14="http://schemas.microsoft.com/office/powerpoint/2010/main" val="4218068252"/>
+      </p:ext>
+    </p:extLst>
+  </p:cSld>
+  <p:clrMapOvr>
+    <a:masterClrMapping/>
+  </p:clrMapOvr>
+</p:sld>
+</file>
+
+<file path=ppt/slides/slide7.xml><?xml version="1.0" encoding="utf-8"?>
+<p:sld xmlns:a="http://schemas.openxmlformats.org/drawingml/2006/main" xmlns:r="http://schemas.openxmlformats.org/officeDocument/2006/relationships" xmlns:p="http://schemas.openxmlformats.org/presentationml/2006/main">
+  <p:cSld>
+    <p:spTree>
+      <p:nvGrpSpPr>
+        <p:cNvPr id="1" name=""/>
+        <p:cNvGrpSpPr/>
+        <p:nvPr/>
+      </p:nvGrpSpPr>
+      <p:grpSpPr>
+        <a:xfrm>
+          <a:off x="0" y="0"/>
+          <a:ext cx="0" cy="0"/>
+          <a:chOff x="0" y="0"/>
+          <a:chExt cx="0" cy="0"/>
+        </a:xfrm>
+      </p:grpSpPr>
+      <p:pic>
+        <p:nvPicPr>
+          <p:cNvPr id="5" name="Picture 4">
+            <a:extLst>
+              <a:ext uri="{FF2B5EF4-FFF2-40B4-BE49-F238E27FC236}">
+                <a16:creationId xmlns:a16="http://schemas.microsoft.com/office/drawing/2014/main" id="{1BB2F93D-BB54-6247-1AD8-23A4F4E70852}"/>
+              </a:ext>
+            </a:extLst>
+          </p:cNvPr>
+          <p:cNvPicPr>
+            <a:picLocks noChangeAspect="1"/>
+          </p:cNvPicPr>
+          <p:nvPr/>
+        </p:nvPicPr>
+        <p:blipFill>
+          <a:blip r:embed="rId2"/>
+          <a:stretch>
+            <a:fillRect/>
+          </a:stretch>
+        </p:blipFill>
+        <p:spPr>
+          <a:xfrm>
+            <a:off x="481566" y="1642269"/>
+            <a:ext cx="6215566" cy="3225800"/>
+          </a:xfrm>
+          <a:prstGeom prst="rect">
+            <a:avLst/>
+          </a:prstGeom>
+        </p:spPr>
+      </p:pic>
+      <p:pic>
+        <p:nvPicPr>
+          <p:cNvPr id="7" name="Picture 6">
+            <a:extLst>
+              <a:ext uri="{FF2B5EF4-FFF2-40B4-BE49-F238E27FC236}">
+                <a16:creationId xmlns:a16="http://schemas.microsoft.com/office/drawing/2014/main" id="{BB88B75E-5259-4ED5-0AF8-1B6B778ED506}"/>
+              </a:ext>
+            </a:extLst>
+          </p:cNvPr>
+          <p:cNvPicPr>
+            <a:picLocks noChangeAspect="1"/>
+          </p:cNvPicPr>
+          <p:nvPr/>
+        </p:nvPicPr>
+        <p:blipFill>
+          <a:blip r:embed="rId3"/>
+          <a:stretch>
+            <a:fillRect/>
+          </a:stretch>
+        </p:blipFill>
+        <p:spPr>
+          <a:xfrm rot="16200000">
+            <a:off x="7365126" y="1023193"/>
+            <a:ext cx="3894668" cy="4954800"/>
+          </a:xfrm>
+          <a:prstGeom prst="rect">
+            <a:avLst/>
+          </a:prstGeom>
+        </p:spPr>
+      </p:pic>
+    </p:spTree>
+    <p:extLst>
+      <p:ext uri="{BB962C8B-B14F-4D97-AF65-F5344CB8AC3E}">
+        <p14:creationId xmlns:p14="http://schemas.microsoft.com/office/powerpoint/2010/main" val="871441554"/>
+      </p:ext>
+    </p:extLst>
+  </p:cSld>
+  <p:clrMapOvr>
+    <a:masterClrMapping/>
+  </p:clrMapOvr>
+</p:sld>
+</file>
+
+<file path=ppt/slides/slide8.xml><?xml version="1.0" encoding="utf-8"?>
+<p:sld xmlns:a="http://schemas.openxmlformats.org/drawingml/2006/main" xmlns:r="http://schemas.openxmlformats.org/officeDocument/2006/relationships" xmlns:p="http://schemas.openxmlformats.org/presentationml/2006/main">
+  <p:cSld>
+    <p:spTree>
+      <p:nvGrpSpPr>
+        <p:cNvPr id="1" name=""/>
+        <p:cNvGrpSpPr/>
+        <p:nvPr/>
+      </p:nvGrpSpPr>
+      <p:grpSpPr>
+        <a:xfrm>
+          <a:off x="0" y="0"/>
+          <a:ext cx="0" cy="0"/>
+          <a:chOff x="0" y="0"/>
+          <a:chExt cx="0" cy="0"/>
+        </a:xfrm>
+      </p:grpSpPr>
+      <p:sp>
+        <p:nvSpPr>
+          <p:cNvPr id="2" name="Title 1">
+            <a:extLst>
+              <a:ext uri="{FF2B5EF4-FFF2-40B4-BE49-F238E27FC236}">
+                <a16:creationId xmlns:a16="http://schemas.microsoft.com/office/drawing/2014/main" id="{D50BA3AB-D6F0-30A7-C4C0-C5E9EC6E24C6}"/>
+              </a:ext>
+            </a:extLst>
+          </p:cNvPr>
+          <p:cNvSpPr>
+            <a:spLocks noGrp="1"/>
+          </p:cNvSpPr>
+          <p:nvPr>
+            <p:ph type="title"/>
+          </p:nvPr>
+        </p:nvSpPr>
+        <p:spPr/>
+        <p:txBody>
+          <a:bodyPr/>
+          <a:lstStyle/>
+          <a:p>
+            <a:endParaRPr lang="en-US"/>
+          </a:p>
+        </p:txBody>
+      </p:sp>
+      <p:sp>
+        <p:nvSpPr>
+          <p:cNvPr id="3" name="Content Placeholder 2">
+            <a:extLst>
+              <a:ext uri="{FF2B5EF4-FFF2-40B4-BE49-F238E27FC236}">
+                <a16:creationId xmlns:a16="http://schemas.microsoft.com/office/drawing/2014/main" id="{F5C90F4D-2652-A811-ED6A-6365C3465D3E}"/>
+              </a:ext>
+            </a:extLst>
+          </p:cNvPr>
+          <p:cNvSpPr>
+            <a:spLocks noGrp="1"/>
+          </p:cNvSpPr>
+          <p:nvPr>
+            <p:ph idx="1"/>
+          </p:nvPr>
+        </p:nvSpPr>
+        <p:spPr/>
+        <p:txBody>
+          <a:bodyPr/>
+          <a:lstStyle/>
+          <a:p>
+            <a:endParaRPr lang="en-US"/>
+          </a:p>
+        </p:txBody>
+      </p:sp>
+    </p:spTree>
+    <p:extLst>
+      <p:ext uri="{BB962C8B-B14F-4D97-AF65-F5344CB8AC3E}">
+        <p14:creationId xmlns:p14="http://schemas.microsoft.com/office/powerpoint/2010/main" val="3859181924"/>
+      </p:ext>
+    </p:extLst>
+  </p:cSld>
+  <p:clrMapOvr>
+    <a:masterClrMapping/>
+  </p:clrMapOvr>
+</p:sld>
+</file>
+
 <file path=ppt/theme/theme1.xml><?xml version="1.0" encoding="utf-8"?>
 <a:theme xmlns:a="http://schemas.openxmlformats.org/drawingml/2006/main" name="Office Theme">
   <a:themeElements>

</xml_diff>

<commit_message>
boards all coming together
</commit_message>
<xml_diff>
--- a/quantumswitchv2.pptx
+++ b/quantumswitchv2.pptx
@@ -13,6 +13,7 @@
     <p:sldId id="262" r:id="rId7"/>
     <p:sldId id="261" r:id="rId8"/>
     <p:sldId id="263" r:id="rId9"/>
+    <p:sldId id="264" r:id="rId10"/>
   </p:sldIdLst>
   <p:sldSz cx="12192000" cy="6858000"/>
   <p:notesSz cx="6858000" cy="9144000"/>
@@ -7181,10 +7182,10 @@
       </p:sp>
       <p:pic>
         <p:nvPicPr>
-          <p:cNvPr id="5" name="Picture 4">
-            <a:extLst>
-              <a:ext uri="{FF2B5EF4-FFF2-40B4-BE49-F238E27FC236}">
-                <a16:creationId xmlns:a16="http://schemas.microsoft.com/office/drawing/2014/main" id="{2DE0C58B-63CA-EE88-AD10-8C60AC57464F}"/>
+          <p:cNvPr id="8" name="Picture 7">
+            <a:extLst>
+              <a:ext uri="{FF2B5EF4-FFF2-40B4-BE49-F238E27FC236}">
+                <a16:creationId xmlns:a16="http://schemas.microsoft.com/office/drawing/2014/main" id="{A5942DA0-BE97-C50B-D611-9E256886ADA8}"/>
               </a:ext>
             </a:extLst>
           </p:cNvPr>
@@ -7201,8 +7202,8 @@
         </p:blipFill>
         <p:spPr>
           <a:xfrm>
-            <a:off x="741035" y="2183363"/>
-            <a:ext cx="4415427" cy="4014612"/>
+            <a:off x="386815" y="1840485"/>
+            <a:ext cx="5329935" cy="4688902"/>
           </a:xfrm>
           <a:prstGeom prst="rect">
             <a:avLst/>
@@ -7211,10 +7212,10 @@
       </p:pic>
       <p:pic>
         <p:nvPicPr>
-          <p:cNvPr id="7" name="Picture 6">
-            <a:extLst>
-              <a:ext uri="{FF2B5EF4-FFF2-40B4-BE49-F238E27FC236}">
-                <a16:creationId xmlns:a16="http://schemas.microsoft.com/office/drawing/2014/main" id="{FAA2BC2E-824C-E581-6291-98B2B6997750}"/>
+          <p:cNvPr id="10" name="Picture 9">
+            <a:extLst>
+              <a:ext uri="{FF2B5EF4-FFF2-40B4-BE49-F238E27FC236}">
+                <a16:creationId xmlns:a16="http://schemas.microsoft.com/office/drawing/2014/main" id="{62723D37-D9B4-DBE3-AAE4-EE7BD6207756}"/>
               </a:ext>
             </a:extLst>
           </p:cNvPr>
@@ -7231,8 +7232,8 @@
         </p:blipFill>
         <p:spPr>
           <a:xfrm>
-            <a:off x="6683849" y="2083103"/>
-            <a:ext cx="4512592" cy="4114872"/>
+            <a:off x="6384010" y="1772591"/>
+            <a:ext cx="5238693" cy="4756796"/>
           </a:xfrm>
           <a:prstGeom prst="rect">
             <a:avLst/>
@@ -7359,60 +7360,100 @@
           <a:chExt cx="0" cy="0"/>
         </a:xfrm>
       </p:grpSpPr>
-      <p:sp>
-        <p:nvSpPr>
-          <p:cNvPr id="2" name="Title 1">
-            <a:extLst>
-              <a:ext uri="{FF2B5EF4-FFF2-40B4-BE49-F238E27FC236}">
-                <a16:creationId xmlns:a16="http://schemas.microsoft.com/office/drawing/2014/main" id="{D50BA3AB-D6F0-30A7-C4C0-C5E9EC6E24C6}"/>
-              </a:ext>
-            </a:extLst>
-          </p:cNvPr>
-          <p:cNvSpPr>
-            <a:spLocks noGrp="1"/>
-          </p:cNvSpPr>
-          <p:nvPr>
-            <p:ph type="title"/>
-          </p:nvPr>
-        </p:nvSpPr>
-        <p:spPr/>
-        <p:txBody>
-          <a:bodyPr/>
-          <a:lstStyle/>
-          <a:p>
-            <a:endParaRPr lang="en-US"/>
-          </a:p>
-        </p:txBody>
-      </p:sp>
-      <p:sp>
-        <p:nvSpPr>
-          <p:cNvPr id="3" name="Content Placeholder 2">
-            <a:extLst>
-              <a:ext uri="{FF2B5EF4-FFF2-40B4-BE49-F238E27FC236}">
-                <a16:creationId xmlns:a16="http://schemas.microsoft.com/office/drawing/2014/main" id="{F5C90F4D-2652-A811-ED6A-6365C3465D3E}"/>
-              </a:ext>
-            </a:extLst>
-          </p:cNvPr>
-          <p:cNvSpPr>
-            <a:spLocks noGrp="1"/>
-          </p:cNvSpPr>
-          <p:nvPr>
-            <p:ph idx="1"/>
-          </p:nvPr>
-        </p:nvSpPr>
-        <p:spPr/>
-        <p:txBody>
-          <a:bodyPr/>
-          <a:lstStyle/>
-          <a:p>
-            <a:endParaRPr lang="en-US"/>
-          </a:p>
-        </p:txBody>
-      </p:sp>
+      <p:pic>
+        <p:nvPicPr>
+          <p:cNvPr id="7" name="Picture 6">
+            <a:extLst>
+              <a:ext uri="{FF2B5EF4-FFF2-40B4-BE49-F238E27FC236}">
+                <a16:creationId xmlns:a16="http://schemas.microsoft.com/office/drawing/2014/main" id="{EDA406E9-D7EE-ADEF-0328-D66ACB1C7D80}"/>
+              </a:ext>
+            </a:extLst>
+          </p:cNvPr>
+          <p:cNvPicPr>
+            <a:picLocks noChangeAspect="1"/>
+          </p:cNvPicPr>
+          <p:nvPr/>
+        </p:nvPicPr>
+        <p:blipFill>
+          <a:blip r:embed="rId2"/>
+          <a:stretch>
+            <a:fillRect/>
+          </a:stretch>
+        </p:blipFill>
+        <p:spPr>
+          <a:xfrm>
+            <a:off x="2137282" y="1246302"/>
+            <a:ext cx="8124825" cy="4648200"/>
+          </a:xfrm>
+          <a:prstGeom prst="rect">
+            <a:avLst/>
+          </a:prstGeom>
+        </p:spPr>
+      </p:pic>
     </p:spTree>
     <p:extLst>
       <p:ext uri="{BB962C8B-B14F-4D97-AF65-F5344CB8AC3E}">
         <p14:creationId xmlns:p14="http://schemas.microsoft.com/office/powerpoint/2010/main" val="3859181924"/>
+      </p:ext>
+    </p:extLst>
+  </p:cSld>
+  <p:clrMapOvr>
+    <a:masterClrMapping/>
+  </p:clrMapOvr>
+</p:sld>
+</file>
+
+<file path=ppt/slides/slide9.xml><?xml version="1.0" encoding="utf-8"?>
+<p:sld xmlns:a="http://schemas.openxmlformats.org/drawingml/2006/main" xmlns:r="http://schemas.openxmlformats.org/officeDocument/2006/relationships" xmlns:p="http://schemas.openxmlformats.org/presentationml/2006/main">
+  <p:cSld>
+    <p:spTree>
+      <p:nvGrpSpPr>
+        <p:cNvPr id="1" name=""/>
+        <p:cNvGrpSpPr/>
+        <p:nvPr/>
+      </p:nvGrpSpPr>
+      <p:grpSpPr>
+        <a:xfrm>
+          <a:off x="0" y="0"/>
+          <a:ext cx="0" cy="0"/>
+          <a:chOff x="0" y="0"/>
+          <a:chExt cx="0" cy="0"/>
+        </a:xfrm>
+      </p:grpSpPr>
+      <p:pic>
+        <p:nvPicPr>
+          <p:cNvPr id="5" name="Picture 4">
+            <a:extLst>
+              <a:ext uri="{FF2B5EF4-FFF2-40B4-BE49-F238E27FC236}">
+                <a16:creationId xmlns:a16="http://schemas.microsoft.com/office/drawing/2014/main" id="{33C78579-D1F6-04EA-EFED-DDC3761C729C}"/>
+              </a:ext>
+            </a:extLst>
+          </p:cNvPr>
+          <p:cNvPicPr>
+            <a:picLocks noChangeAspect="1"/>
+          </p:cNvPicPr>
+          <p:nvPr/>
+        </p:nvPicPr>
+        <p:blipFill>
+          <a:blip r:embed="rId2"/>
+          <a:stretch>
+            <a:fillRect/>
+          </a:stretch>
+        </p:blipFill>
+        <p:spPr>
+          <a:xfrm>
+            <a:off x="904875" y="1743075"/>
+            <a:ext cx="10382250" cy="3371850"/>
+          </a:xfrm>
+          <a:prstGeom prst="rect">
+            <a:avLst/>
+          </a:prstGeom>
+        </p:spPr>
+      </p:pic>
+    </p:spTree>
+    <p:extLst>
+      <p:ext uri="{BB962C8B-B14F-4D97-AF65-F5344CB8AC3E}">
+        <p14:creationId xmlns:p14="http://schemas.microsoft.com/office/powerpoint/2010/main" val="827264353"/>
       </p:ext>
     </p:extLst>
   </p:cSld>

</xml_diff>